<commit_message>
Edited the final page in the presentation
</commit_message>
<xml_diff>
--- a/Final-Elec-Pres.pptx
+++ b/Final-Elec-Pres.pptx
@@ -8885,7 +8885,9 @@
         </p:nvSpPr>
         <p:spPr/>
         <p:txBody>
-          <a:bodyPr/>
+          <a:bodyPr>
+            <a:normAutofit fontScale="92500" lnSpcReduction="20000"/>
+          </a:bodyPr>
           <a:lstStyle/>
           <a:p>
             <a:r>
@@ -8920,8 +8922,55 @@
           <a:p>
             <a:r>
               <a:rPr lang="en-US" dirty="0"/>
-              <a:t>The data analysis can be found here:</a:t>
-            </a:r>
+              <a:t>The data analysis and this presentation can be found here:</a:t>
+            </a:r>
+          </a:p>
+          <a:p>
+            <a:pPr marL="0" indent="0">
+              <a:buNone/>
+            </a:pPr>
+            <a:r>
+              <a:rPr lang="en-US" dirty="0">
+                <a:hlinkClick r:id="rId3"/>
+              </a:rPr>
+              <a:t>https://github.com/werdnamac/DE-USA-Electricity-Presentation</a:t>
+            </a:r>
+            <a:r>
+              <a:rPr lang="en-US" dirty="0"/>
+              <a:t> </a:t>
+            </a:r>
+          </a:p>
+          <a:p>
+            <a:pPr marL="0" indent="0">
+              <a:buNone/>
+            </a:pPr>
+            <a:endParaRPr lang="en-US" dirty="0"/>
+          </a:p>
+          <a:p>
+            <a:pPr marL="0" indent="0">
+              <a:buNone/>
+            </a:pPr>
+            <a:r>
+              <a:rPr lang="en-US" dirty="0"/>
+              <a:t>You can view a PDF version of the presentation on GitHub </a:t>
+            </a:r>
+            <a:r>
+              <a:rPr lang="en-US"/>
+              <a:t>without downloading the file.</a:t>
+            </a:r>
+            <a:endParaRPr lang="en-US" dirty="0"/>
+          </a:p>
+          <a:p>
+            <a:pPr marL="0" indent="0">
+              <a:buNone/>
+            </a:pPr>
+            <a:r>
+              <a:rPr lang="en-US" dirty="0"/>
+              <a:t>To see the PowerPoint presentation version, or to see the data analysis Excel workbook, you must download those files from GitHub.</a:t>
+            </a:r>
+          </a:p>
+          <a:p>
+            <a:endParaRPr lang="en-US" dirty="0"/>
           </a:p>
           <a:p>
             <a:endParaRPr lang="en-US" dirty="0"/>

</xml_diff>